<commit_message>
Created SAR Heatmap Tree v1
</commit_message>
<xml_diff>
--- a/Images/Figures_PPT/AlveolataHeatPlot.pptx
+++ b/Images/Figures_PPT/AlveolataHeatPlot.pptx
@@ -41162,7 +41162,7 @@
               <a:avLst/>
             </a:prstGeom>
             <a:solidFill>
-              <a:srgbClr val="DBC795">
+              <a:srgbClr val="FFFFFF">
                 <a:alpha val="100000"/>
               </a:srgbClr>
             </a:solidFill>
@@ -41267,7 +41267,7 @@
               <a:avLst/>
             </a:prstGeom>
             <a:solidFill>
-              <a:srgbClr val="DBC795">
+              <a:srgbClr val="FFFFFF">
                 <a:alpha val="100000"/>
               </a:srgbClr>
             </a:solidFill>

</xml_diff>